<commit_message>
Conversion to imzML instructions
</commit_message>
<xml_diff>
--- a/raw_to_imzML_quickstart.pptx
+++ b/raw_to_imzML_quickstart.pptx
@@ -250,7 +250,7 @@
           <a:p>
             <a:fld id="{15AA0365-80C3-43FF-AB38-E6ED04986FE5}" type="datetimeFigureOut">
               <a:rPr lang="en-GB" smtClean="0"/>
-              <a:t>29/06/2017</a:t>
+              <a:t>04/07/2017</a:t>
             </a:fld>
             <a:endParaRPr lang="en-GB"/>
           </a:p>
@@ -420,7 +420,7 @@
           <a:p>
             <a:fld id="{15AA0365-80C3-43FF-AB38-E6ED04986FE5}" type="datetimeFigureOut">
               <a:rPr lang="en-GB" smtClean="0"/>
-              <a:t>29/06/2017</a:t>
+              <a:t>04/07/2017</a:t>
             </a:fld>
             <a:endParaRPr lang="en-GB"/>
           </a:p>
@@ -600,7 +600,7 @@
           <a:p>
             <a:fld id="{15AA0365-80C3-43FF-AB38-E6ED04986FE5}" type="datetimeFigureOut">
               <a:rPr lang="en-GB" smtClean="0"/>
-              <a:t>29/06/2017</a:t>
+              <a:t>04/07/2017</a:t>
             </a:fld>
             <a:endParaRPr lang="en-GB"/>
           </a:p>
@@ -770,7 +770,7 @@
           <a:p>
             <a:fld id="{15AA0365-80C3-43FF-AB38-E6ED04986FE5}" type="datetimeFigureOut">
               <a:rPr lang="en-GB" smtClean="0"/>
-              <a:t>29/06/2017</a:t>
+              <a:t>04/07/2017</a:t>
             </a:fld>
             <a:endParaRPr lang="en-GB"/>
           </a:p>
@@ -1016,7 +1016,7 @@
           <a:p>
             <a:fld id="{15AA0365-80C3-43FF-AB38-E6ED04986FE5}" type="datetimeFigureOut">
               <a:rPr lang="en-GB" smtClean="0"/>
-              <a:t>29/06/2017</a:t>
+              <a:t>04/07/2017</a:t>
             </a:fld>
             <a:endParaRPr lang="en-GB"/>
           </a:p>
@@ -1248,7 +1248,7 @@
           <a:p>
             <a:fld id="{15AA0365-80C3-43FF-AB38-E6ED04986FE5}" type="datetimeFigureOut">
               <a:rPr lang="en-GB" smtClean="0"/>
-              <a:t>29/06/2017</a:t>
+              <a:t>04/07/2017</a:t>
             </a:fld>
             <a:endParaRPr lang="en-GB"/>
           </a:p>
@@ -1615,7 +1615,7 @@
           <a:p>
             <a:fld id="{15AA0365-80C3-43FF-AB38-E6ED04986FE5}" type="datetimeFigureOut">
               <a:rPr lang="en-GB" smtClean="0"/>
-              <a:t>29/06/2017</a:t>
+              <a:t>04/07/2017</a:t>
             </a:fld>
             <a:endParaRPr lang="en-GB"/>
           </a:p>
@@ -1733,7 +1733,7 @@
           <a:p>
             <a:fld id="{15AA0365-80C3-43FF-AB38-E6ED04986FE5}" type="datetimeFigureOut">
               <a:rPr lang="en-GB" smtClean="0"/>
-              <a:t>29/06/2017</a:t>
+              <a:t>04/07/2017</a:t>
             </a:fld>
             <a:endParaRPr lang="en-GB"/>
           </a:p>
@@ -1828,7 +1828,7 @@
           <a:p>
             <a:fld id="{15AA0365-80C3-43FF-AB38-E6ED04986FE5}" type="datetimeFigureOut">
               <a:rPr lang="en-GB" smtClean="0"/>
-              <a:t>29/06/2017</a:t>
+              <a:t>04/07/2017</a:t>
             </a:fld>
             <a:endParaRPr lang="en-GB"/>
           </a:p>
@@ -2105,7 +2105,7 @@
           <a:p>
             <a:fld id="{15AA0365-80C3-43FF-AB38-E6ED04986FE5}" type="datetimeFigureOut">
               <a:rPr lang="en-GB" smtClean="0"/>
-              <a:t>29/06/2017</a:t>
+              <a:t>04/07/2017</a:t>
             </a:fld>
             <a:endParaRPr lang="en-GB"/>
           </a:p>
@@ -2358,7 +2358,7 @@
           <a:p>
             <a:fld id="{15AA0365-80C3-43FF-AB38-E6ED04986FE5}" type="datetimeFigureOut">
               <a:rPr lang="en-GB" smtClean="0"/>
-              <a:t>29/06/2017</a:t>
+              <a:t>04/07/2017</a:t>
             </a:fld>
             <a:endParaRPr lang="en-GB"/>
           </a:p>
@@ -2571,7 +2571,7 @@
           <a:p>
             <a:fld id="{15AA0365-80C3-43FF-AB38-E6ED04986FE5}" type="datetimeFigureOut">
               <a:rPr lang="en-GB" smtClean="0"/>
-              <a:t>29/06/2017</a:t>
+              <a:t>04/07/2017</a:t>
             </a:fld>
             <a:endParaRPr lang="en-GB"/>
           </a:p>
@@ -3003,7 +3003,7 @@
           <a:p>
             <a:pPr algn="ctr"/>
             <a:r>
-              <a:rPr lang="en-GB" sz="3000" b="1" dirty="0" smtClean="0"/>
+              <a:rPr lang="en-GB" sz="3000" b="1" smtClean="0"/>
               <a:t>Converting </a:t>
             </a:r>
             <a:r>
@@ -3015,12 +3015,12 @@
               <a:t> .raw file to .</a:t>
             </a:r>
             <a:r>
-              <a:rPr lang="en-GB" sz="3000" b="1" smtClean="0"/>
-              <a:t>imzML </a:t>
+              <a:rPr lang="en-GB" sz="3000" b="1" dirty="0" err="1" smtClean="0"/>
+              <a:t>imzML</a:t>
             </a:r>
             <a:r>
               <a:rPr lang="en-GB" sz="3000" b="1" dirty="0" smtClean="0"/>
-              <a:t>format</a:t>
+              <a:t> format</a:t>
             </a:r>
             <a:endParaRPr lang="en-GB" sz="3000" b="1" dirty="0"/>
           </a:p>
@@ -3175,11 +3175,7 @@
             </a:r>
             <a:r>
               <a:rPr lang="en-GB" dirty="0" smtClean="0"/>
-              <a:t> </a:t>
-            </a:r>
-            <a:r>
-              <a:rPr lang="en-GB" dirty="0" smtClean="0"/>
-              <a:t>tool to convert files to </a:t>
+              <a:t> tool to convert files to </a:t>
             </a:r>
             <a:r>
               <a:rPr lang="en-GB" dirty="0" err="1" smtClean="0"/>

</xml_diff>